<commit_message>
mise a jour diapo
</commit_message>
<xml_diff>
--- a/Rapport/Presentation_BE_BUSO_GAY-PUIG.pptx
+++ b/Rapport/Presentation_BE_BUSO_GAY-PUIG.pptx
@@ -5,15 +5,15 @@
     <p:sldMasterId id="2147483648" r:id="rId1"/>
   </p:sldMasterIdLst>
   <p:notesMasterIdLst>
-    <p:notesMasterId r:id="rId15"/>
+    <p:notesMasterId r:id="rId17"/>
   </p:notesMasterIdLst>
   <p:sldIdLst>
     <p:sldId id="276" r:id="rId2"/>
     <p:sldId id="277" r:id="rId3"/>
-    <p:sldId id="278" r:id="rId4"/>
-    <p:sldId id="279" r:id="rId5"/>
-    <p:sldId id="280" r:id="rId6"/>
-    <p:sldId id="281" r:id="rId7"/>
+    <p:sldId id="280" r:id="rId4"/>
+    <p:sldId id="281" r:id="rId5"/>
+    <p:sldId id="278" r:id="rId6"/>
+    <p:sldId id="279" r:id="rId7"/>
     <p:sldId id="282" r:id="rId8"/>
     <p:sldId id="284" r:id="rId9"/>
     <p:sldId id="285" r:id="rId10"/>
@@ -21,6 +21,8 @@
     <p:sldId id="287" r:id="rId12"/>
     <p:sldId id="288" r:id="rId13"/>
     <p:sldId id="289" r:id="rId14"/>
+    <p:sldId id="290" r:id="rId15"/>
+    <p:sldId id="291" r:id="rId16"/>
   </p:sldIdLst>
   <p:sldSz cx="12192000" cy="6858000"/>
   <p:notesSz cx="6858000" cy="9144000"/>
@@ -209,7 +211,7 @@
           <a:p>
             <a:fld id="{32AB2C6B-C371-4F30-AFD4-D827697055E2}" type="datetimeFigureOut">
               <a:rPr lang="fr-FR" smtClean="0"/>
-              <a:t>17/05/2022</a:t>
+              <a:t>18/05/2022</a:t>
             </a:fld>
             <a:endParaRPr lang="fr-FR"/>
           </a:p>
@@ -476,6 +478,101 @@
 </p:notesMaster>
 </file>
 
+<file path=ppt/notesSlides/notesSlide1.xml><?xml version="1.0" encoding="utf-8"?>
+<p:notes xmlns:a="http://schemas.openxmlformats.org/drawingml/2006/main" xmlns:r="http://schemas.openxmlformats.org/officeDocument/2006/relationships" xmlns:p="http://schemas.openxmlformats.org/presentationml/2006/main">
+  <p:cSld>
+    <p:spTree>
+      <p:nvGrpSpPr>
+        <p:cNvPr id="1" name=""/>
+        <p:cNvGrpSpPr/>
+        <p:nvPr/>
+      </p:nvGrpSpPr>
+      <p:grpSpPr>
+        <a:xfrm>
+          <a:off x="0" y="0"/>
+          <a:ext cx="0" cy="0"/>
+          <a:chOff x="0" y="0"/>
+          <a:chExt cx="0" cy="0"/>
+        </a:xfrm>
+      </p:grpSpPr>
+      <p:sp>
+        <p:nvSpPr>
+          <p:cNvPr id="2" name="Espace réservé de l'image des diapositives 1"/>
+          <p:cNvSpPr>
+            <a:spLocks noGrp="1" noRot="1" noChangeAspect="1"/>
+          </p:cNvSpPr>
+          <p:nvPr>
+            <p:ph type="sldImg"/>
+          </p:nvPr>
+        </p:nvSpPr>
+        <p:spPr/>
+      </p:sp>
+      <p:sp>
+        <p:nvSpPr>
+          <p:cNvPr id="3" name="Espace réservé des notes 2"/>
+          <p:cNvSpPr>
+            <a:spLocks noGrp="1"/>
+          </p:cNvSpPr>
+          <p:nvPr>
+            <p:ph type="body" idx="1"/>
+          </p:nvPr>
+        </p:nvSpPr>
+        <p:spPr/>
+        <p:txBody>
+          <a:bodyPr/>
+          <a:lstStyle/>
+          <a:p>
+            <a:r>
+              <a:rPr lang="fr-FR" dirty="0"/>
+              <a:t>Explication </a:t>
+            </a:r>
+            <a:r>
+              <a:rPr lang="fr-FR" dirty="0" err="1"/>
+              <a:t>pwm</a:t>
+            </a:r>
+            <a:endParaRPr lang="fr-FR" dirty="0"/>
+          </a:p>
+          <a:p>
+            <a:endParaRPr lang="fr-FR" dirty="0"/>
+          </a:p>
+        </p:txBody>
+      </p:sp>
+      <p:sp>
+        <p:nvSpPr>
+          <p:cNvPr id="4" name="Espace réservé du numéro de diapositive 3"/>
+          <p:cNvSpPr>
+            <a:spLocks noGrp="1"/>
+          </p:cNvSpPr>
+          <p:nvPr>
+            <p:ph type="sldNum" sz="quarter" idx="5"/>
+          </p:nvPr>
+        </p:nvSpPr>
+        <p:spPr/>
+        <p:txBody>
+          <a:bodyPr/>
+          <a:lstStyle/>
+          <a:p>
+            <a:fld id="{263F4D62-BB35-4EBD-923B-DFB15F284FDE}" type="slidenum">
+              <a:rPr lang="fr-FR" smtClean="0"/>
+              <a:t>4</a:t>
+            </a:fld>
+            <a:endParaRPr lang="fr-FR"/>
+          </a:p>
+        </p:txBody>
+      </p:sp>
+    </p:spTree>
+    <p:extLst>
+      <p:ext uri="{BB962C8B-B14F-4D97-AF65-F5344CB8AC3E}">
+        <p14:creationId xmlns:p14="http://schemas.microsoft.com/office/powerpoint/2010/main" val="3713930128"/>
+      </p:ext>
+    </p:extLst>
+  </p:cSld>
+  <p:clrMapOvr>
+    <a:masterClrMapping/>
+  </p:clrMapOvr>
+</p:notes>
+</file>
+
 <file path=ppt/slideLayouts/slideLayout1.xml><?xml version="1.0" encoding="utf-8"?>
 <p:sldLayout xmlns:a="http://schemas.openxmlformats.org/drawingml/2006/main" xmlns:r="http://schemas.openxmlformats.org/officeDocument/2006/relationships" xmlns:p="http://schemas.openxmlformats.org/presentationml/2006/main" type="title" preserve="1">
   <p:cSld name="Diapositive de titre">
@@ -721,7 +818,7 @@
           <a:p>
             <a:fld id="{BCCB8DA4-A6FB-4B6D-8435-FDEB11753D31}" type="datetime1">
               <a:rPr lang="en-US" smtClean="0"/>
-              <a:t>5/17/2022</a:t>
+              <a:t>5/18/2022</a:t>
             </a:fld>
             <a:endParaRPr lang="en-US" dirty="0"/>
           </a:p>
@@ -979,7 +1076,7 @@
           <a:p>
             <a:fld id="{26D63198-70F6-4036-A053-B2F28700EC1B}" type="datetime1">
               <a:rPr lang="en-US" smtClean="0"/>
-              <a:t>5/17/2022</a:t>
+              <a:t>5/18/2022</a:t>
             </a:fld>
             <a:endParaRPr lang="en-US" dirty="0"/>
           </a:p>
@@ -1210,7 +1307,7 @@
           <a:p>
             <a:fld id="{F537243D-ECF8-4458-AEBE-D1652454E528}" type="datetime1">
               <a:rPr lang="en-US" smtClean="0"/>
-              <a:t>5/17/2022</a:t>
+              <a:t>5/18/2022</a:t>
             </a:fld>
             <a:endParaRPr lang="en-US" dirty="0"/>
           </a:p>
@@ -1446,7 +1543,7 @@
           <a:p>
             <a:fld id="{E43E6E99-9CD9-4333-8B42-70085247C77B}" type="datetime1">
               <a:rPr lang="en-US" smtClean="0"/>
-              <a:t>5/17/2022</a:t>
+              <a:t>5/18/2022</a:t>
             </a:fld>
             <a:endParaRPr lang="en-US" dirty="0"/>
           </a:p>
@@ -1753,7 +1850,7 @@
           <a:p>
             <a:fld id="{A0A9D6F4-BB15-40E4-A5B7-7F153C1791A8}" type="datetime1">
               <a:rPr lang="en-US" smtClean="0"/>
-              <a:t>5/17/2022</a:t>
+              <a:t>5/18/2022</a:t>
             </a:fld>
             <a:endParaRPr lang="en-US" dirty="0"/>
           </a:p>
@@ -2051,7 +2148,7 @@
           <a:p>
             <a:fld id="{EBFD008E-B98F-458E-A520-0BB7E5862FDA}" type="datetime1">
               <a:rPr lang="en-US" smtClean="0"/>
-              <a:t>5/17/2022</a:t>
+              <a:t>5/18/2022</a:t>
             </a:fld>
             <a:endParaRPr lang="en-US" dirty="0"/>
           </a:p>
@@ -2469,7 +2566,7 @@
           <a:p>
             <a:fld id="{52F7DE96-53AA-4C86-9D5B-23C93578C90B}" type="datetime1">
               <a:rPr lang="en-US" smtClean="0"/>
-              <a:t>5/17/2022</a:t>
+              <a:t>5/18/2022</a:t>
             </a:fld>
             <a:endParaRPr lang="en-US" dirty="0"/>
           </a:p>
@@ -2627,7 +2724,7 @@
           <a:p>
             <a:fld id="{FE93F6D0-532E-4C8E-B9AB-43B692EDA8DF}" type="datetime1">
               <a:rPr lang="en-US" smtClean="0"/>
-              <a:t>5/17/2022</a:t>
+              <a:t>5/18/2022</a:t>
             </a:fld>
             <a:endParaRPr lang="en-US" dirty="0"/>
           </a:p>
@@ -2718,7 +2815,7 @@
           <a:p>
             <a:fld id="{B717AFB8-8047-4326-B5C2-A134DCF24DC3}" type="datetime1">
               <a:rPr lang="en-US" smtClean="0"/>
-              <a:t>5/17/2022</a:t>
+              <a:t>5/18/2022</a:t>
             </a:fld>
             <a:endParaRPr lang="en-US" dirty="0"/>
           </a:p>
@@ -3092,7 +3189,7 @@
           <a:p>
             <a:fld id="{9AC62F80-C1BD-4BC6-BDFE-FC6E0E310E79}" type="datetime1">
               <a:rPr lang="en-US" smtClean="0"/>
-              <a:t>5/17/2022</a:t>
+              <a:t>5/18/2022</a:t>
             </a:fld>
             <a:endParaRPr lang="en-US" dirty="0"/>
           </a:p>
@@ -3377,7 +3474,7 @@
           <a:p>
             <a:fld id="{55479694-D051-4050-8031-38C766237AC3}" type="datetime1">
               <a:rPr lang="en-US" smtClean="0"/>
-              <a:t>5/17/2022</a:t>
+              <a:t>5/18/2022</a:t>
             </a:fld>
             <a:endParaRPr lang="en-US" dirty="0"/>
           </a:p>
@@ -3584,7 +3681,7 @@
           <a:p>
             <a:fld id="{D7CCE4AB-F25B-473B-8195-D378D74F0C8A}" type="datetime1">
               <a:rPr lang="en-US" smtClean="0"/>
-              <a:t>5/17/2022</a:t>
+              <a:t>5/18/2022</a:t>
             </a:fld>
             <a:endParaRPr lang="en-US" dirty="0"/>
           </a:p>
@@ -4450,15 +4547,8 @@
                   <a:schemeClr val="bg1"/>
                 </a:solidFill>
               </a:rPr>
-              <a:t>III- Réalisation du projet</a:t>
-            </a:r>
-          </a:p>
-          <a:p>
-            <a:endParaRPr lang="fr-FR" sz="2400" b="1" dirty="0">
-              <a:solidFill>
-                <a:schemeClr val="bg1"/>
-              </a:solidFill>
-            </a:endParaRPr>
+              <a:t>III- Réalisation du drone</a:t>
+            </a:r>
           </a:p>
           <a:p>
             <a:endParaRPr lang="fr-FR" sz="2400" b="1" dirty="0">
@@ -5318,8 +5408,8 @@
           </a:p>
         </p:txBody>
       </p:sp>
-      <mc:AlternateContent xmlns:mc="http://schemas.openxmlformats.org/markup-compatibility/2006">
-        <mc:Choice xmlns:a14="http://schemas.microsoft.com/office/drawing/2010/main" Requires="a14">
+      <mc:AlternateContent xmlns:mc="http://schemas.openxmlformats.org/markup-compatibility/2006" xmlns:a14="http://schemas.microsoft.com/office/drawing/2010/main">
+        <mc:Choice Requires="a14">
           <p:sp>
             <p:nvSpPr>
               <p:cNvPr id="7" name="ZoneTexte 6">
@@ -5631,7 +5721,7 @@
             </p:txBody>
           </p:sp>
         </mc:Choice>
-        <mc:Fallback>
+        <mc:Fallback xmlns="">
           <p:sp>
             <p:nvSpPr>
               <p:cNvPr id="7" name="ZoneTexte 6">
@@ -5761,6 +5851,449 @@
 </p:sld>
 </file>
 
+<file path=ppt/slides/slide14.xml><?xml version="1.0" encoding="utf-8"?>
+<p:sld xmlns:a="http://schemas.openxmlformats.org/drawingml/2006/main" xmlns:r="http://schemas.openxmlformats.org/officeDocument/2006/relationships" xmlns:p="http://schemas.openxmlformats.org/presentationml/2006/main">
+  <p:cSld>
+    <p:spTree>
+      <p:nvGrpSpPr>
+        <p:cNvPr id="1" name=""/>
+        <p:cNvGrpSpPr/>
+        <p:nvPr/>
+      </p:nvGrpSpPr>
+      <p:grpSpPr>
+        <a:xfrm>
+          <a:off x="0" y="0"/>
+          <a:ext cx="0" cy="0"/>
+          <a:chOff x="0" y="0"/>
+          <a:chExt cx="0" cy="0"/>
+        </a:xfrm>
+      </p:grpSpPr>
+      <p:sp>
+        <p:nvSpPr>
+          <p:cNvPr id="2" name="Titre 1">
+            <a:extLst>
+              <a:ext uri="{FF2B5EF4-FFF2-40B4-BE49-F238E27FC236}">
+                <a16:creationId xmlns:a16="http://schemas.microsoft.com/office/drawing/2014/main" id="{E84278D6-EA06-3BCA-8864-5030A8D50B38}"/>
+              </a:ext>
+            </a:extLst>
+          </p:cNvPr>
+          <p:cNvSpPr>
+            <a:spLocks noGrp="1"/>
+          </p:cNvSpPr>
+          <p:nvPr>
+            <p:ph type="title"/>
+          </p:nvPr>
+        </p:nvSpPr>
+        <p:spPr/>
+        <p:txBody>
+          <a:bodyPr/>
+          <a:lstStyle/>
+          <a:p>
+            <a:r>
+              <a:rPr lang="fr-FR" dirty="0"/>
+              <a:t>Conclusion</a:t>
+            </a:r>
+          </a:p>
+        </p:txBody>
+      </p:sp>
+      <p:sp>
+        <p:nvSpPr>
+          <p:cNvPr id="5" name="Espace réservé du numéro de diapositive 4">
+            <a:extLst>
+              <a:ext uri="{FF2B5EF4-FFF2-40B4-BE49-F238E27FC236}">
+                <a16:creationId xmlns:a16="http://schemas.microsoft.com/office/drawing/2014/main" id="{60004811-F83D-AF56-B774-DCAECAD13B7C}"/>
+              </a:ext>
+            </a:extLst>
+          </p:cNvPr>
+          <p:cNvSpPr>
+            <a:spLocks noGrp="1"/>
+          </p:cNvSpPr>
+          <p:nvPr>
+            <p:ph type="sldNum" sz="quarter" idx="12"/>
+          </p:nvPr>
+        </p:nvSpPr>
+        <p:spPr/>
+        <p:txBody>
+          <a:bodyPr/>
+          <a:lstStyle/>
+          <a:p>
+            <a:fld id="{D57F1E4F-1CFF-5643-939E-217C01CDF565}" type="slidenum">
+              <a:rPr lang="en-US" smtClean="0"/>
+              <a:pPr/>
+              <a:t>14</a:t>
+            </a:fld>
+            <a:endParaRPr lang="en-US" dirty="0"/>
+          </a:p>
+        </p:txBody>
+      </p:sp>
+      <p:pic>
+        <p:nvPicPr>
+          <p:cNvPr id="1030" name="Picture 6">
+            <a:extLst>
+              <a:ext uri="{FF2B5EF4-FFF2-40B4-BE49-F238E27FC236}">
+                <a16:creationId xmlns:a16="http://schemas.microsoft.com/office/drawing/2014/main" id="{EAC248C3-335D-5081-AA2B-0E9A4CCBDA22}"/>
+              </a:ext>
+            </a:extLst>
+          </p:cNvPr>
+          <p:cNvPicPr>
+            <a:picLocks noGrp="1" noChangeAspect="1" noChangeArrowheads="1"/>
+          </p:cNvPicPr>
+          <p:nvPr>
+            <p:ph sz="half" idx="2"/>
+          </p:nvPr>
+        </p:nvPicPr>
+        <p:blipFill>
+          <a:blip r:embed="rId2">
+            <a:extLst>
+              <a:ext uri="{28A0092B-C50C-407E-A947-70E740481C1C}">
+                <a14:useLocalDpi xmlns:a14="http://schemas.microsoft.com/office/drawing/2010/main" val="0"/>
+              </a:ext>
+            </a:extLst>
+          </a:blip>
+          <a:srcRect/>
+          <a:stretch>
+            <a:fillRect/>
+          </a:stretch>
+        </p:blipFill>
+        <p:spPr bwMode="auto">
+          <a:xfrm>
+            <a:off x="6096000" y="2227263"/>
+            <a:ext cx="5422900" cy="3409648"/>
+          </a:xfrm>
+          <a:prstGeom prst="rect">
+            <a:avLst/>
+          </a:prstGeom>
+          <a:noFill/>
+          <a:extLst>
+            <a:ext uri="{909E8E84-426E-40DD-AFC4-6F175D3DCCD1}">
+              <a14:hiddenFill xmlns:a14="http://schemas.microsoft.com/office/drawing/2010/main">
+                <a:solidFill>
+                  <a:srgbClr val="FFFFFF"/>
+                </a:solidFill>
+              </a14:hiddenFill>
+            </a:ext>
+          </a:extLst>
+        </p:spPr>
+      </p:pic>
+      <p:pic>
+        <p:nvPicPr>
+          <p:cNvPr id="1034" name="Picture 10">
+            <a:extLst>
+              <a:ext uri="{FF2B5EF4-FFF2-40B4-BE49-F238E27FC236}">
+                <a16:creationId xmlns:a16="http://schemas.microsoft.com/office/drawing/2014/main" id="{5E476C75-FA56-BC55-098D-F7E4A7C7D6D6}"/>
+              </a:ext>
+            </a:extLst>
+          </p:cNvPr>
+          <p:cNvPicPr>
+            <a:picLocks noGrp="1" noChangeAspect="1" noChangeArrowheads="1"/>
+          </p:cNvPicPr>
+          <p:nvPr>
+            <p:ph sz="half" idx="1"/>
+          </p:nvPr>
+        </p:nvPicPr>
+        <p:blipFill>
+          <a:blip r:embed="rId3">
+            <a:extLst>
+              <a:ext uri="{28A0092B-C50C-407E-A947-70E740481C1C}">
+                <a14:useLocalDpi xmlns:a14="http://schemas.microsoft.com/office/drawing/2010/main" val="0"/>
+              </a:ext>
+            </a:extLst>
+          </a:blip>
+          <a:srcRect/>
+          <a:stretch>
+            <a:fillRect/>
+          </a:stretch>
+        </p:blipFill>
+        <p:spPr bwMode="auto">
+          <a:xfrm>
+            <a:off x="869950" y="2227263"/>
+            <a:ext cx="4845049" cy="3633787"/>
+          </a:xfrm>
+          <a:prstGeom prst="rect">
+            <a:avLst/>
+          </a:prstGeom>
+          <a:noFill/>
+          <a:extLst>
+            <a:ext uri="{909E8E84-426E-40DD-AFC4-6F175D3DCCD1}">
+              <a14:hiddenFill xmlns:a14="http://schemas.microsoft.com/office/drawing/2010/main">
+                <a:solidFill>
+                  <a:srgbClr val="FFFFFF"/>
+                </a:solidFill>
+              </a14:hiddenFill>
+            </a:ext>
+          </a:extLst>
+        </p:spPr>
+      </p:pic>
+    </p:spTree>
+    <p:extLst>
+      <p:ext uri="{BB962C8B-B14F-4D97-AF65-F5344CB8AC3E}">
+        <p14:creationId xmlns:p14="http://schemas.microsoft.com/office/powerpoint/2010/main" val="2338645787"/>
+      </p:ext>
+    </p:extLst>
+  </p:cSld>
+  <p:clrMapOvr>
+    <a:masterClrMapping/>
+  </p:clrMapOvr>
+</p:sld>
+</file>
+
+<file path=ppt/slides/slide15.xml><?xml version="1.0" encoding="utf-8"?>
+<p:sld xmlns:a="http://schemas.openxmlformats.org/drawingml/2006/main" xmlns:r="http://schemas.openxmlformats.org/officeDocument/2006/relationships" xmlns:p="http://schemas.openxmlformats.org/presentationml/2006/main">
+  <p:cSld>
+    <p:spTree>
+      <p:nvGrpSpPr>
+        <p:cNvPr id="1" name=""/>
+        <p:cNvGrpSpPr/>
+        <p:nvPr/>
+      </p:nvGrpSpPr>
+      <p:grpSpPr>
+        <a:xfrm>
+          <a:off x="0" y="0"/>
+          <a:ext cx="0" cy="0"/>
+          <a:chOff x="0" y="0"/>
+          <a:chExt cx="0" cy="0"/>
+        </a:xfrm>
+      </p:grpSpPr>
+      <p:sp>
+        <p:nvSpPr>
+          <p:cNvPr id="5" name="Espace réservé du numéro de diapositive 4">
+            <a:extLst>
+              <a:ext uri="{FF2B5EF4-FFF2-40B4-BE49-F238E27FC236}">
+                <a16:creationId xmlns:a16="http://schemas.microsoft.com/office/drawing/2014/main" id="{2AB83450-CC00-E47C-65A5-8485811374FF}"/>
+              </a:ext>
+            </a:extLst>
+          </p:cNvPr>
+          <p:cNvSpPr>
+            <a:spLocks noGrp="1"/>
+          </p:cNvSpPr>
+          <p:nvPr>
+            <p:ph type="sldNum" sz="quarter" idx="12"/>
+          </p:nvPr>
+        </p:nvSpPr>
+        <p:spPr/>
+        <p:txBody>
+          <a:bodyPr/>
+          <a:lstStyle/>
+          <a:p>
+            <a:fld id="{D57F1E4F-1CFF-5643-939E-217C01CDF565}" type="slidenum">
+              <a:rPr lang="en-US" smtClean="0"/>
+              <a:pPr/>
+              <a:t>15</a:t>
+            </a:fld>
+            <a:endParaRPr lang="en-US" dirty="0"/>
+          </a:p>
+        </p:txBody>
+      </p:sp>
+      <p:sp>
+        <p:nvSpPr>
+          <p:cNvPr id="2" name="Titre 1">
+            <a:extLst>
+              <a:ext uri="{FF2B5EF4-FFF2-40B4-BE49-F238E27FC236}">
+                <a16:creationId xmlns:a16="http://schemas.microsoft.com/office/drawing/2014/main" id="{E1BA1D48-4654-B4D3-461D-458F1E1F4761}"/>
+              </a:ext>
+            </a:extLst>
+          </p:cNvPr>
+          <p:cNvSpPr>
+            <a:spLocks noGrp="1"/>
+          </p:cNvSpPr>
+          <p:nvPr>
+            <p:ph type="title" idx="4294967295"/>
+          </p:nvPr>
+        </p:nvSpPr>
+        <p:spPr>
+          <a:xfrm>
+            <a:off x="580860" y="453067"/>
+            <a:ext cx="11029950" cy="987425"/>
+          </a:xfrm>
+        </p:spPr>
+        <p:txBody>
+          <a:bodyPr>
+            <a:normAutofit/>
+          </a:bodyPr>
+          <a:lstStyle/>
+          <a:p>
+            <a:pPr algn="ctr"/>
+            <a:r>
+              <a:rPr lang="fr-FR" sz="3600" dirty="0">
+                <a:solidFill>
+                  <a:schemeClr val="tx1"/>
+                </a:solidFill>
+              </a:rPr>
+              <a:t>Merci de votre attention</a:t>
+            </a:r>
+          </a:p>
+        </p:txBody>
+      </p:sp>
+      <p:sp>
+        <p:nvSpPr>
+          <p:cNvPr id="6" name="Titre 1">
+            <a:extLst>
+              <a:ext uri="{FF2B5EF4-FFF2-40B4-BE49-F238E27FC236}">
+                <a16:creationId xmlns:a16="http://schemas.microsoft.com/office/drawing/2014/main" id="{8FEC703A-BE91-A5F2-D9AF-9D8DBD9AF937}"/>
+              </a:ext>
+            </a:extLst>
+          </p:cNvPr>
+          <p:cNvSpPr txBox="1">
+            <a:spLocks/>
+          </p:cNvSpPr>
+          <p:nvPr/>
+        </p:nvSpPr>
+        <p:spPr>
+          <a:xfrm>
+            <a:off x="580860" y="5151274"/>
+            <a:ext cx="11029950" cy="987425"/>
+          </a:xfrm>
+          <a:prstGeom prst="rect">
+            <a:avLst/>
+          </a:prstGeom>
+        </p:spPr>
+        <p:txBody>
+          <a:bodyPr vert="horz" lIns="91440" tIns="45720" rIns="91440" bIns="45720" rtlCol="0" anchor="b">
+            <a:normAutofit/>
+          </a:bodyPr>
+          <a:lstStyle>
+            <a:lvl1pPr algn="l" defTabSz="457200" rtl="0" eaLnBrk="1" latinLnBrk="0" hangingPunct="1">
+              <a:spcBef>
+                <a:spcPct val="0"/>
+              </a:spcBef>
+              <a:buNone/>
+              <a:defRPr sz="2800" b="0" kern="1200" cap="all">
+                <a:solidFill>
+                  <a:schemeClr val="bg1"/>
+                </a:solidFill>
+                <a:latin typeface="+mj-lt"/>
+                <a:ea typeface="+mj-ea"/>
+                <a:cs typeface="+mj-cs"/>
+              </a:defRPr>
+            </a:lvl1pPr>
+            <a:lvl2pPr eaLnBrk="1" hangingPunct="1">
+              <a:defRPr>
+                <a:solidFill>
+                  <a:schemeClr val="tx2"/>
+                </a:solidFill>
+              </a:defRPr>
+            </a:lvl2pPr>
+            <a:lvl3pPr eaLnBrk="1" hangingPunct="1">
+              <a:defRPr>
+                <a:solidFill>
+                  <a:schemeClr val="tx2"/>
+                </a:solidFill>
+              </a:defRPr>
+            </a:lvl3pPr>
+            <a:lvl4pPr eaLnBrk="1" hangingPunct="1">
+              <a:defRPr>
+                <a:solidFill>
+                  <a:schemeClr val="tx2"/>
+                </a:solidFill>
+              </a:defRPr>
+            </a:lvl4pPr>
+            <a:lvl5pPr eaLnBrk="1" hangingPunct="1">
+              <a:defRPr>
+                <a:solidFill>
+                  <a:schemeClr val="tx2"/>
+                </a:solidFill>
+              </a:defRPr>
+            </a:lvl5pPr>
+            <a:lvl6pPr eaLnBrk="1" hangingPunct="1">
+              <a:defRPr>
+                <a:solidFill>
+                  <a:schemeClr val="tx2"/>
+                </a:solidFill>
+              </a:defRPr>
+            </a:lvl6pPr>
+            <a:lvl7pPr eaLnBrk="1" hangingPunct="1">
+              <a:defRPr>
+                <a:solidFill>
+                  <a:schemeClr val="tx2"/>
+                </a:solidFill>
+              </a:defRPr>
+            </a:lvl7pPr>
+            <a:lvl8pPr eaLnBrk="1" hangingPunct="1">
+              <a:defRPr>
+                <a:solidFill>
+                  <a:schemeClr val="tx2"/>
+                </a:solidFill>
+              </a:defRPr>
+            </a:lvl8pPr>
+            <a:lvl9pPr eaLnBrk="1" hangingPunct="1">
+              <a:defRPr>
+                <a:solidFill>
+                  <a:schemeClr val="tx2"/>
+                </a:solidFill>
+              </a:defRPr>
+            </a:lvl9pPr>
+          </a:lstStyle>
+          <a:p>
+            <a:pPr algn="ctr"/>
+            <a:r>
+              <a:rPr lang="fr-FR" sz="3600" dirty="0">
+                <a:solidFill>
+                  <a:schemeClr val="tx1"/>
+                </a:solidFill>
+              </a:rPr>
+              <a:t>AVEZ-VOUS des Question ?</a:t>
+            </a:r>
+          </a:p>
+        </p:txBody>
+      </p:sp>
+      <p:pic>
+        <p:nvPicPr>
+          <p:cNvPr id="2050" name="Picture 2">
+            <a:extLst>
+              <a:ext uri="{FF2B5EF4-FFF2-40B4-BE49-F238E27FC236}">
+                <a16:creationId xmlns:a16="http://schemas.microsoft.com/office/drawing/2014/main" id="{4E56E94A-46CF-3288-0601-DA623F6F5C80}"/>
+              </a:ext>
+            </a:extLst>
+          </p:cNvPr>
+          <p:cNvPicPr>
+            <a:picLocks noChangeAspect="1" noChangeArrowheads="1"/>
+          </p:cNvPicPr>
+          <p:nvPr/>
+        </p:nvPicPr>
+        <p:blipFill rotWithShape="1">
+          <a:blip r:embed="rId2">
+            <a:extLst>
+              <a:ext uri="{28A0092B-C50C-407E-A947-70E740481C1C}">
+                <a14:useLocalDpi xmlns:a14="http://schemas.microsoft.com/office/drawing/2010/main" val="0"/>
+              </a:ext>
+            </a:extLst>
+          </a:blip>
+          <a:srcRect t="10738" b="15743"/>
+          <a:stretch/>
+        </p:blipFill>
+        <p:spPr bwMode="auto">
+          <a:xfrm>
+            <a:off x="3228810" y="1810512"/>
+            <a:ext cx="5734050" cy="3158199"/>
+          </a:xfrm>
+          <a:prstGeom prst="rect">
+            <a:avLst/>
+          </a:prstGeom>
+          <a:noFill/>
+          <a:extLst>
+            <a:ext uri="{909E8E84-426E-40DD-AFC4-6F175D3DCCD1}">
+              <a14:hiddenFill xmlns:a14="http://schemas.microsoft.com/office/drawing/2010/main">
+                <a:solidFill>
+                  <a:srgbClr val="FFFFFF"/>
+                </a:solidFill>
+              </a14:hiddenFill>
+            </a:ext>
+          </a:extLst>
+        </p:spPr>
+      </p:pic>
+    </p:spTree>
+    <p:extLst>
+      <p:ext uri="{BB962C8B-B14F-4D97-AF65-F5344CB8AC3E}">
+        <p14:creationId xmlns:p14="http://schemas.microsoft.com/office/powerpoint/2010/main" val="1554185128"/>
+      </p:ext>
+    </p:extLst>
+  </p:cSld>
+  <p:clrMapOvr>
+    <a:masterClrMapping/>
+  </p:clrMapOvr>
+</p:sld>
+</file>
+
 <file path=ppt/slides/slide2.xml><?xml version="1.0" encoding="utf-8"?>
 <p:sld xmlns:a="http://schemas.openxmlformats.org/drawingml/2006/main" xmlns:r="http://schemas.openxmlformats.org/officeDocument/2006/relationships" xmlns:p="http://schemas.openxmlformats.org/presentationml/2006/main">
   <p:cSld>
@@ -7216,40 +7749,19 @@
           <a:p>
             <a:r>
               <a:rPr lang="fr-FR" dirty="0"/>
-              <a:t>Radio-télécommande / Récepteur RF </a:t>
-            </a:r>
-          </a:p>
-        </p:txBody>
-      </p:sp>
-      <p:pic>
-        <p:nvPicPr>
-          <p:cNvPr id="8" name="Espace réservé du contenu 7">
-            <a:extLst>
-              <a:ext uri="{FF2B5EF4-FFF2-40B4-BE49-F238E27FC236}">
-                <a16:creationId xmlns:a16="http://schemas.microsoft.com/office/drawing/2014/main" id="{F9BD7EC2-61C8-414F-A8F3-3EF0D7B70BD8}"/>
-              </a:ext>
-            </a:extLst>
-          </p:cNvPr>
-          <p:cNvPicPr>
-            <a:picLocks noGrp="1" noChangeAspect="1"/>
-          </p:cNvPicPr>
-          <p:nvPr>
-            <p:ph sz="half" idx="2"/>
-          </p:nvPr>
-        </p:nvPicPr>
-        <p:blipFill>
-          <a:blip r:embed="rId2"/>
-          <a:stretch>
-            <a:fillRect/>
-          </a:stretch>
-        </p:blipFill>
-        <p:spPr>
-          <a:xfrm>
-            <a:off x="5159828" y="2717079"/>
-            <a:ext cx="2712356" cy="2935450"/>
-          </a:xfrm>
-        </p:spPr>
-      </p:pic>
+              <a:t>ESC / Moteurs </a:t>
+            </a:r>
+            <a:r>
+              <a:rPr lang="fr-FR" dirty="0" err="1"/>
+              <a:t>brushless</a:t>
+            </a:r>
+            <a:r>
+              <a:rPr lang="fr-FR" dirty="0"/>
+              <a:t> </a:t>
+            </a:r>
+          </a:p>
+        </p:txBody>
+      </p:sp>
       <p:sp>
         <p:nvSpPr>
           <p:cNvPr id="4" name="Espace réservé du numéro de diapositive 3">
@@ -7282,10 +7794,10 @@
       </p:sp>
       <p:pic>
         <p:nvPicPr>
-          <p:cNvPr id="1026" name="Picture 2">
+          <p:cNvPr id="3074" name="Picture 2">
             <a:extLst>
               <a:ext uri="{FF2B5EF4-FFF2-40B4-BE49-F238E27FC236}">
-                <a16:creationId xmlns:a16="http://schemas.microsoft.com/office/drawing/2014/main" id="{D1817146-42C8-48F4-B049-380B0868C182}"/>
+                <a16:creationId xmlns:a16="http://schemas.microsoft.com/office/drawing/2014/main" id="{DF517916-2CAA-4235-8D29-1D30019D14DE}"/>
               </a:ext>
             </a:extLst>
           </p:cNvPr>
@@ -7295,7 +7807,7 @@
           <p:nvPr/>
         </p:nvPicPr>
         <p:blipFill>
-          <a:blip r:embed="rId3">
+          <a:blip r:embed="rId2">
             <a:extLst>
               <a:ext uri="{28A0092B-C50C-407E-A947-70E740481C1C}">
                 <a14:useLocalDpi xmlns:a14="http://schemas.microsoft.com/office/drawing/2010/main" val="0"/>
@@ -7309,8 +7821,8 @@
         </p:blipFill>
         <p:spPr bwMode="auto">
           <a:xfrm>
-            <a:off x="293914" y="3227655"/>
-            <a:ext cx="4865914" cy="2424874"/>
+            <a:off x="683093" y="2881180"/>
+            <a:ext cx="6907180" cy="3074957"/>
           </a:xfrm>
           <a:prstGeom prst="rect">
             <a:avLst/>
@@ -7329,10 +7841,10 @@
       </p:pic>
       <p:pic>
         <p:nvPicPr>
-          <p:cNvPr id="7" name="Image 6">
+          <p:cNvPr id="6" name="Image 5" descr="Une image contenant connecteur, câble&#10;&#10;Description générée automatiquement">
             <a:extLst>
               <a:ext uri="{FF2B5EF4-FFF2-40B4-BE49-F238E27FC236}">
-                <a16:creationId xmlns:a16="http://schemas.microsoft.com/office/drawing/2014/main" id="{6BB23350-1875-001F-49EF-D0FA3DCE59CC}"/>
+                <a16:creationId xmlns:a16="http://schemas.microsoft.com/office/drawing/2014/main" id="{83EF32E6-A27C-4859-8CAD-D905185B2DC0}"/>
               </a:ext>
             </a:extLst>
           </p:cNvPr>
@@ -7342,21 +7854,15 @@
           <p:nvPr/>
         </p:nvPicPr>
         <p:blipFill>
-          <a:blip r:embed="rId4">
-            <a:extLst>
-              <a:ext uri="{28A0092B-C50C-407E-A947-70E740481C1C}">
-                <a14:useLocalDpi xmlns:a14="http://schemas.microsoft.com/office/drawing/2010/main" val="0"/>
-              </a:ext>
-            </a:extLst>
-          </a:blip>
+          <a:blip r:embed="rId3"/>
           <a:stretch>
             <a:fillRect/>
           </a:stretch>
         </p:blipFill>
         <p:spPr>
           <a:xfrm>
-            <a:off x="8157029" y="2972003"/>
-            <a:ext cx="3594100" cy="2695575"/>
+            <a:off x="8224430" y="2576573"/>
+            <a:ext cx="3284477" cy="3284477"/>
           </a:xfrm>
           <a:prstGeom prst="rect">
             <a:avLst/>
@@ -7366,7 +7872,7 @@
     </p:spTree>
     <p:extLst>
       <p:ext uri="{BB962C8B-B14F-4D97-AF65-F5344CB8AC3E}">
-        <p14:creationId xmlns:p14="http://schemas.microsoft.com/office/powerpoint/2010/main" val="1825180080"/>
+        <p14:creationId xmlns:p14="http://schemas.microsoft.com/office/powerpoint/2010/main" val="2137423748"/>
       </p:ext>
     </p:extLst>
   </p:cSld>
@@ -7444,7 +7950,15 @@
           <a:p>
             <a:r>
               <a:rPr lang="fr-FR" dirty="0"/>
-              <a:t>Radio-télécommande / Récepteur RF </a:t>
+              <a:t>ESC / Moteurs </a:t>
+            </a:r>
+            <a:r>
+              <a:rPr lang="fr-FR" dirty="0" err="1"/>
+              <a:t>brushless</a:t>
+            </a:r>
+            <a:r>
+              <a:rPr lang="fr-FR" dirty="0"/>
+              <a:t> </a:t>
             </a:r>
           </a:p>
         </p:txBody>
@@ -7474,6 +7988,379 @@
               <a:rPr lang="en-US" smtClean="0"/>
               <a:pPr/>
               <a:t>4</a:t>
+            </a:fld>
+            <a:endParaRPr lang="en-US" dirty="0"/>
+          </a:p>
+        </p:txBody>
+      </p:sp>
+      <p:pic>
+        <p:nvPicPr>
+          <p:cNvPr id="6" name="Image 5">
+            <a:extLst>
+              <a:ext uri="{FF2B5EF4-FFF2-40B4-BE49-F238E27FC236}">
+                <a16:creationId xmlns:a16="http://schemas.microsoft.com/office/drawing/2014/main" id="{733D7656-48F5-4788-AD8B-492825DE3419}"/>
+              </a:ext>
+            </a:extLst>
+          </p:cNvPr>
+          <p:cNvPicPr>
+            <a:picLocks noChangeAspect="1"/>
+          </p:cNvPicPr>
+          <p:nvPr/>
+        </p:nvPicPr>
+        <p:blipFill rotWithShape="1">
+          <a:blip r:embed="rId3"/>
+          <a:srcRect r="34062"/>
+          <a:stretch/>
+        </p:blipFill>
+        <p:spPr>
+          <a:xfrm>
+            <a:off x="3736093" y="2402447"/>
+            <a:ext cx="4719814" cy="3553690"/>
+          </a:xfrm>
+          <a:prstGeom prst="rect">
+            <a:avLst/>
+          </a:prstGeom>
+        </p:spPr>
+      </p:pic>
+    </p:spTree>
+    <p:extLst>
+      <p:ext uri="{BB962C8B-B14F-4D97-AF65-F5344CB8AC3E}">
+        <p14:creationId xmlns:p14="http://schemas.microsoft.com/office/powerpoint/2010/main" val="700632873"/>
+      </p:ext>
+    </p:extLst>
+  </p:cSld>
+  <p:clrMapOvr>
+    <a:masterClrMapping/>
+  </p:clrMapOvr>
+</p:sld>
+</file>
+
+<file path=ppt/slides/slide5.xml><?xml version="1.0" encoding="utf-8"?>
+<p:sld xmlns:a="http://schemas.openxmlformats.org/drawingml/2006/main" xmlns:r="http://schemas.openxmlformats.org/officeDocument/2006/relationships" xmlns:p="http://schemas.openxmlformats.org/presentationml/2006/main">
+  <p:cSld>
+    <p:spTree>
+      <p:nvGrpSpPr>
+        <p:cNvPr id="1" name=""/>
+        <p:cNvGrpSpPr/>
+        <p:nvPr/>
+      </p:nvGrpSpPr>
+      <p:grpSpPr>
+        <a:xfrm>
+          <a:off x="0" y="0"/>
+          <a:ext cx="0" cy="0"/>
+          <a:chOff x="0" y="0"/>
+          <a:chExt cx="0" cy="0"/>
+        </a:xfrm>
+      </p:grpSpPr>
+      <p:sp>
+        <p:nvSpPr>
+          <p:cNvPr id="2" name="Titre 1">
+            <a:extLst>
+              <a:ext uri="{FF2B5EF4-FFF2-40B4-BE49-F238E27FC236}">
+                <a16:creationId xmlns:a16="http://schemas.microsoft.com/office/drawing/2014/main" id="{B2F989FB-C56F-4DBE-8BD5-8217486EF679}"/>
+              </a:ext>
+            </a:extLst>
+          </p:cNvPr>
+          <p:cNvSpPr>
+            <a:spLocks noGrp="1"/>
+          </p:cNvSpPr>
+          <p:nvPr>
+            <p:ph type="title"/>
+          </p:nvPr>
+        </p:nvSpPr>
+        <p:spPr/>
+        <p:txBody>
+          <a:bodyPr/>
+          <a:lstStyle/>
+          <a:p>
+            <a:r>
+              <a:rPr lang="fr-FR" dirty="0"/>
+              <a:t>II- Anatomie du drone </a:t>
+            </a:r>
+          </a:p>
+        </p:txBody>
+      </p:sp>
+      <p:sp>
+        <p:nvSpPr>
+          <p:cNvPr id="5" name="Espace réservé du contenu 4">
+            <a:extLst>
+              <a:ext uri="{FF2B5EF4-FFF2-40B4-BE49-F238E27FC236}">
+                <a16:creationId xmlns:a16="http://schemas.microsoft.com/office/drawing/2014/main" id="{BD261B13-EB79-473B-96D5-121DE8B27CF7}"/>
+              </a:ext>
+            </a:extLst>
+          </p:cNvPr>
+          <p:cNvSpPr>
+            <a:spLocks noGrp="1"/>
+          </p:cNvSpPr>
+          <p:nvPr>
+            <p:ph sz="half" idx="1"/>
+          </p:nvPr>
+        </p:nvSpPr>
+        <p:spPr/>
+        <p:txBody>
+          <a:bodyPr anchor="t"/>
+          <a:lstStyle/>
+          <a:p>
+            <a:r>
+              <a:rPr lang="fr-FR" dirty="0"/>
+              <a:t>Radio-télécommande / Récepteur RF </a:t>
+            </a:r>
+          </a:p>
+        </p:txBody>
+      </p:sp>
+      <p:pic>
+        <p:nvPicPr>
+          <p:cNvPr id="8" name="Espace réservé du contenu 7">
+            <a:extLst>
+              <a:ext uri="{FF2B5EF4-FFF2-40B4-BE49-F238E27FC236}">
+                <a16:creationId xmlns:a16="http://schemas.microsoft.com/office/drawing/2014/main" id="{F9BD7EC2-61C8-414F-A8F3-3EF0D7B70BD8}"/>
+              </a:ext>
+            </a:extLst>
+          </p:cNvPr>
+          <p:cNvPicPr>
+            <a:picLocks noGrp="1" noChangeAspect="1"/>
+          </p:cNvPicPr>
+          <p:nvPr>
+            <p:ph sz="half" idx="2"/>
+          </p:nvPr>
+        </p:nvPicPr>
+        <p:blipFill>
+          <a:blip r:embed="rId2"/>
+          <a:stretch>
+            <a:fillRect/>
+          </a:stretch>
+        </p:blipFill>
+        <p:spPr>
+          <a:xfrm>
+            <a:off x="5159828" y="2717079"/>
+            <a:ext cx="2712356" cy="2935450"/>
+          </a:xfrm>
+        </p:spPr>
+      </p:pic>
+      <p:sp>
+        <p:nvSpPr>
+          <p:cNvPr id="4" name="Espace réservé du numéro de diapositive 3">
+            <a:extLst>
+              <a:ext uri="{FF2B5EF4-FFF2-40B4-BE49-F238E27FC236}">
+                <a16:creationId xmlns:a16="http://schemas.microsoft.com/office/drawing/2014/main" id="{BD632CD5-BD5D-4D52-8704-2578DD021FB2}"/>
+              </a:ext>
+            </a:extLst>
+          </p:cNvPr>
+          <p:cNvSpPr>
+            <a:spLocks noGrp="1"/>
+          </p:cNvSpPr>
+          <p:nvPr>
+            <p:ph type="sldNum" sz="quarter" idx="12"/>
+          </p:nvPr>
+        </p:nvSpPr>
+        <p:spPr/>
+        <p:txBody>
+          <a:bodyPr/>
+          <a:lstStyle/>
+          <a:p>
+            <a:fld id="{D57F1E4F-1CFF-5643-939E-217C01CDF565}" type="slidenum">
+              <a:rPr lang="en-US" smtClean="0"/>
+              <a:pPr/>
+              <a:t>5</a:t>
+            </a:fld>
+            <a:endParaRPr lang="en-US" dirty="0"/>
+          </a:p>
+        </p:txBody>
+      </p:sp>
+      <p:pic>
+        <p:nvPicPr>
+          <p:cNvPr id="1026" name="Picture 2">
+            <a:extLst>
+              <a:ext uri="{FF2B5EF4-FFF2-40B4-BE49-F238E27FC236}">
+                <a16:creationId xmlns:a16="http://schemas.microsoft.com/office/drawing/2014/main" id="{D1817146-42C8-48F4-B049-380B0868C182}"/>
+              </a:ext>
+            </a:extLst>
+          </p:cNvPr>
+          <p:cNvPicPr>
+            <a:picLocks noChangeAspect="1" noChangeArrowheads="1"/>
+          </p:cNvPicPr>
+          <p:nvPr/>
+        </p:nvPicPr>
+        <p:blipFill>
+          <a:blip r:embed="rId3">
+            <a:extLst>
+              <a:ext uri="{28A0092B-C50C-407E-A947-70E740481C1C}">
+                <a14:useLocalDpi xmlns:a14="http://schemas.microsoft.com/office/drawing/2010/main" val="0"/>
+              </a:ext>
+            </a:extLst>
+          </a:blip>
+          <a:srcRect/>
+          <a:stretch>
+            <a:fillRect/>
+          </a:stretch>
+        </p:blipFill>
+        <p:spPr bwMode="auto">
+          <a:xfrm>
+            <a:off x="293914" y="3227655"/>
+            <a:ext cx="4865914" cy="2424874"/>
+          </a:xfrm>
+          <a:prstGeom prst="rect">
+            <a:avLst/>
+          </a:prstGeom>
+          <a:noFill/>
+          <a:extLst>
+            <a:ext uri="{909E8E84-426E-40DD-AFC4-6F175D3DCCD1}">
+              <a14:hiddenFill xmlns:a14="http://schemas.microsoft.com/office/drawing/2010/main">
+                <a:solidFill>
+                  <a:srgbClr val="FFFFFF"/>
+                </a:solidFill>
+              </a14:hiddenFill>
+            </a:ext>
+          </a:extLst>
+        </p:spPr>
+      </p:pic>
+      <p:pic>
+        <p:nvPicPr>
+          <p:cNvPr id="7" name="Image 6">
+            <a:extLst>
+              <a:ext uri="{FF2B5EF4-FFF2-40B4-BE49-F238E27FC236}">
+                <a16:creationId xmlns:a16="http://schemas.microsoft.com/office/drawing/2014/main" id="{6BB23350-1875-001F-49EF-D0FA3DCE59CC}"/>
+              </a:ext>
+            </a:extLst>
+          </p:cNvPr>
+          <p:cNvPicPr>
+            <a:picLocks noChangeAspect="1"/>
+          </p:cNvPicPr>
+          <p:nvPr/>
+        </p:nvPicPr>
+        <p:blipFill>
+          <a:blip r:embed="rId4">
+            <a:extLst>
+              <a:ext uri="{28A0092B-C50C-407E-A947-70E740481C1C}">
+                <a14:useLocalDpi xmlns:a14="http://schemas.microsoft.com/office/drawing/2010/main" val="0"/>
+              </a:ext>
+            </a:extLst>
+          </a:blip>
+          <a:stretch>
+            <a:fillRect/>
+          </a:stretch>
+        </p:blipFill>
+        <p:spPr>
+          <a:xfrm>
+            <a:off x="8157029" y="2972003"/>
+            <a:ext cx="3594100" cy="2695575"/>
+          </a:xfrm>
+          <a:prstGeom prst="rect">
+            <a:avLst/>
+          </a:prstGeom>
+        </p:spPr>
+      </p:pic>
+    </p:spTree>
+    <p:extLst>
+      <p:ext uri="{BB962C8B-B14F-4D97-AF65-F5344CB8AC3E}">
+        <p14:creationId xmlns:p14="http://schemas.microsoft.com/office/powerpoint/2010/main" val="1825180080"/>
+      </p:ext>
+    </p:extLst>
+  </p:cSld>
+  <p:clrMapOvr>
+    <a:masterClrMapping/>
+  </p:clrMapOvr>
+</p:sld>
+</file>
+
+<file path=ppt/slides/slide6.xml><?xml version="1.0" encoding="utf-8"?>
+<p:sld xmlns:a="http://schemas.openxmlformats.org/drawingml/2006/main" xmlns:r="http://schemas.openxmlformats.org/officeDocument/2006/relationships" xmlns:p="http://schemas.openxmlformats.org/presentationml/2006/main">
+  <p:cSld>
+    <p:spTree>
+      <p:nvGrpSpPr>
+        <p:cNvPr id="1" name=""/>
+        <p:cNvGrpSpPr/>
+        <p:nvPr/>
+      </p:nvGrpSpPr>
+      <p:grpSpPr>
+        <a:xfrm>
+          <a:off x="0" y="0"/>
+          <a:ext cx="0" cy="0"/>
+          <a:chOff x="0" y="0"/>
+          <a:chExt cx="0" cy="0"/>
+        </a:xfrm>
+      </p:grpSpPr>
+      <p:sp>
+        <p:nvSpPr>
+          <p:cNvPr id="2" name="Titre 1">
+            <a:extLst>
+              <a:ext uri="{FF2B5EF4-FFF2-40B4-BE49-F238E27FC236}">
+                <a16:creationId xmlns:a16="http://schemas.microsoft.com/office/drawing/2014/main" id="{B2F989FB-C56F-4DBE-8BD5-8217486EF679}"/>
+              </a:ext>
+            </a:extLst>
+          </p:cNvPr>
+          <p:cNvSpPr>
+            <a:spLocks noGrp="1"/>
+          </p:cNvSpPr>
+          <p:nvPr>
+            <p:ph type="title"/>
+          </p:nvPr>
+        </p:nvSpPr>
+        <p:spPr/>
+        <p:txBody>
+          <a:bodyPr/>
+          <a:lstStyle/>
+          <a:p>
+            <a:r>
+              <a:rPr lang="fr-FR" dirty="0"/>
+              <a:t>II- Anatomie du drone </a:t>
+            </a:r>
+          </a:p>
+        </p:txBody>
+      </p:sp>
+      <p:sp>
+        <p:nvSpPr>
+          <p:cNvPr id="5" name="Espace réservé du contenu 4">
+            <a:extLst>
+              <a:ext uri="{FF2B5EF4-FFF2-40B4-BE49-F238E27FC236}">
+                <a16:creationId xmlns:a16="http://schemas.microsoft.com/office/drawing/2014/main" id="{BD261B13-EB79-473B-96D5-121DE8B27CF7}"/>
+              </a:ext>
+            </a:extLst>
+          </p:cNvPr>
+          <p:cNvSpPr>
+            <a:spLocks noGrp="1"/>
+          </p:cNvSpPr>
+          <p:nvPr>
+            <p:ph sz="half" idx="1"/>
+          </p:nvPr>
+        </p:nvSpPr>
+        <p:spPr/>
+        <p:txBody>
+          <a:bodyPr anchor="t"/>
+          <a:lstStyle/>
+          <a:p>
+            <a:r>
+              <a:rPr lang="fr-FR" dirty="0"/>
+              <a:t>Radio-télécommande / Récepteur RF </a:t>
+            </a:r>
+          </a:p>
+        </p:txBody>
+      </p:sp>
+      <p:sp>
+        <p:nvSpPr>
+          <p:cNvPr id="4" name="Espace réservé du numéro de diapositive 3">
+            <a:extLst>
+              <a:ext uri="{FF2B5EF4-FFF2-40B4-BE49-F238E27FC236}">
+                <a16:creationId xmlns:a16="http://schemas.microsoft.com/office/drawing/2014/main" id="{BD632CD5-BD5D-4D52-8704-2578DD021FB2}"/>
+              </a:ext>
+            </a:extLst>
+          </p:cNvPr>
+          <p:cNvSpPr>
+            <a:spLocks noGrp="1"/>
+          </p:cNvSpPr>
+          <p:nvPr>
+            <p:ph type="sldNum" sz="quarter" idx="12"/>
+          </p:nvPr>
+        </p:nvSpPr>
+        <p:spPr/>
+        <p:txBody>
+          <a:bodyPr/>
+          <a:lstStyle/>
+          <a:p>
+            <a:fld id="{D57F1E4F-1CFF-5643-939E-217C01CDF565}" type="slidenum">
+              <a:rPr lang="en-US" smtClean="0"/>
+              <a:pPr/>
+              <a:t>6</a:t>
             </a:fld>
             <a:endParaRPr lang="en-US" dirty="0"/>
           </a:p>
@@ -7713,361 +8600,6 @@
     <p:extLst>
       <p:ext uri="{BB962C8B-B14F-4D97-AF65-F5344CB8AC3E}">
         <p14:creationId xmlns:p14="http://schemas.microsoft.com/office/powerpoint/2010/main" val="3056804004"/>
-      </p:ext>
-    </p:extLst>
-  </p:cSld>
-  <p:clrMapOvr>
-    <a:masterClrMapping/>
-  </p:clrMapOvr>
-</p:sld>
-</file>
-
-<file path=ppt/slides/slide5.xml><?xml version="1.0" encoding="utf-8"?>
-<p:sld xmlns:a="http://schemas.openxmlformats.org/drawingml/2006/main" xmlns:r="http://schemas.openxmlformats.org/officeDocument/2006/relationships" xmlns:p="http://schemas.openxmlformats.org/presentationml/2006/main">
-  <p:cSld>
-    <p:spTree>
-      <p:nvGrpSpPr>
-        <p:cNvPr id="1" name=""/>
-        <p:cNvGrpSpPr/>
-        <p:nvPr/>
-      </p:nvGrpSpPr>
-      <p:grpSpPr>
-        <a:xfrm>
-          <a:off x="0" y="0"/>
-          <a:ext cx="0" cy="0"/>
-          <a:chOff x="0" y="0"/>
-          <a:chExt cx="0" cy="0"/>
-        </a:xfrm>
-      </p:grpSpPr>
-      <p:sp>
-        <p:nvSpPr>
-          <p:cNvPr id="2" name="Titre 1">
-            <a:extLst>
-              <a:ext uri="{FF2B5EF4-FFF2-40B4-BE49-F238E27FC236}">
-                <a16:creationId xmlns:a16="http://schemas.microsoft.com/office/drawing/2014/main" id="{B2F989FB-C56F-4DBE-8BD5-8217486EF679}"/>
-              </a:ext>
-            </a:extLst>
-          </p:cNvPr>
-          <p:cNvSpPr>
-            <a:spLocks noGrp="1"/>
-          </p:cNvSpPr>
-          <p:nvPr>
-            <p:ph type="title"/>
-          </p:nvPr>
-        </p:nvSpPr>
-        <p:spPr/>
-        <p:txBody>
-          <a:bodyPr/>
-          <a:lstStyle/>
-          <a:p>
-            <a:r>
-              <a:rPr lang="fr-FR" dirty="0"/>
-              <a:t>II- Anatomie du drone </a:t>
-            </a:r>
-          </a:p>
-        </p:txBody>
-      </p:sp>
-      <p:sp>
-        <p:nvSpPr>
-          <p:cNvPr id="5" name="Espace réservé du contenu 4">
-            <a:extLst>
-              <a:ext uri="{FF2B5EF4-FFF2-40B4-BE49-F238E27FC236}">
-                <a16:creationId xmlns:a16="http://schemas.microsoft.com/office/drawing/2014/main" id="{BD261B13-EB79-473B-96D5-121DE8B27CF7}"/>
-              </a:ext>
-            </a:extLst>
-          </p:cNvPr>
-          <p:cNvSpPr>
-            <a:spLocks noGrp="1"/>
-          </p:cNvSpPr>
-          <p:nvPr>
-            <p:ph sz="half" idx="1"/>
-          </p:nvPr>
-        </p:nvSpPr>
-        <p:spPr/>
-        <p:txBody>
-          <a:bodyPr anchor="t"/>
-          <a:lstStyle/>
-          <a:p>
-            <a:r>
-              <a:rPr lang="fr-FR" dirty="0"/>
-              <a:t>ESC / Moteurs </a:t>
-            </a:r>
-            <a:r>
-              <a:rPr lang="fr-FR" dirty="0" err="1"/>
-              <a:t>brushless</a:t>
-            </a:r>
-            <a:r>
-              <a:rPr lang="fr-FR" dirty="0"/>
-              <a:t> </a:t>
-            </a:r>
-          </a:p>
-        </p:txBody>
-      </p:sp>
-      <p:sp>
-        <p:nvSpPr>
-          <p:cNvPr id="4" name="Espace réservé du numéro de diapositive 3">
-            <a:extLst>
-              <a:ext uri="{FF2B5EF4-FFF2-40B4-BE49-F238E27FC236}">
-                <a16:creationId xmlns:a16="http://schemas.microsoft.com/office/drawing/2014/main" id="{BD632CD5-BD5D-4D52-8704-2578DD021FB2}"/>
-              </a:ext>
-            </a:extLst>
-          </p:cNvPr>
-          <p:cNvSpPr>
-            <a:spLocks noGrp="1"/>
-          </p:cNvSpPr>
-          <p:nvPr>
-            <p:ph type="sldNum" sz="quarter" idx="12"/>
-          </p:nvPr>
-        </p:nvSpPr>
-        <p:spPr/>
-        <p:txBody>
-          <a:bodyPr/>
-          <a:lstStyle/>
-          <a:p>
-            <a:fld id="{D57F1E4F-1CFF-5643-939E-217C01CDF565}" type="slidenum">
-              <a:rPr lang="en-US" smtClean="0"/>
-              <a:pPr/>
-              <a:t>5</a:t>
-            </a:fld>
-            <a:endParaRPr lang="en-US" dirty="0"/>
-          </a:p>
-        </p:txBody>
-      </p:sp>
-      <p:pic>
-        <p:nvPicPr>
-          <p:cNvPr id="3074" name="Picture 2">
-            <a:extLst>
-              <a:ext uri="{FF2B5EF4-FFF2-40B4-BE49-F238E27FC236}">
-                <a16:creationId xmlns:a16="http://schemas.microsoft.com/office/drawing/2014/main" id="{DF517916-2CAA-4235-8D29-1D30019D14DE}"/>
-              </a:ext>
-            </a:extLst>
-          </p:cNvPr>
-          <p:cNvPicPr>
-            <a:picLocks noChangeAspect="1" noChangeArrowheads="1"/>
-          </p:cNvPicPr>
-          <p:nvPr/>
-        </p:nvPicPr>
-        <p:blipFill>
-          <a:blip r:embed="rId2">
-            <a:extLst>
-              <a:ext uri="{28A0092B-C50C-407E-A947-70E740481C1C}">
-                <a14:useLocalDpi xmlns:a14="http://schemas.microsoft.com/office/drawing/2010/main" val="0"/>
-              </a:ext>
-            </a:extLst>
-          </a:blip>
-          <a:srcRect/>
-          <a:stretch>
-            <a:fillRect/>
-          </a:stretch>
-        </p:blipFill>
-        <p:spPr bwMode="auto">
-          <a:xfrm>
-            <a:off x="683093" y="2881180"/>
-            <a:ext cx="6907180" cy="3074957"/>
-          </a:xfrm>
-          <a:prstGeom prst="rect">
-            <a:avLst/>
-          </a:prstGeom>
-          <a:noFill/>
-          <a:extLst>
-            <a:ext uri="{909E8E84-426E-40DD-AFC4-6F175D3DCCD1}">
-              <a14:hiddenFill xmlns:a14="http://schemas.microsoft.com/office/drawing/2010/main">
-                <a:solidFill>
-                  <a:srgbClr val="FFFFFF"/>
-                </a:solidFill>
-              </a14:hiddenFill>
-            </a:ext>
-          </a:extLst>
-        </p:spPr>
-      </p:pic>
-      <p:pic>
-        <p:nvPicPr>
-          <p:cNvPr id="6" name="Image 5" descr="Une image contenant connecteur, câble&#10;&#10;Description générée automatiquement">
-            <a:extLst>
-              <a:ext uri="{FF2B5EF4-FFF2-40B4-BE49-F238E27FC236}">
-                <a16:creationId xmlns:a16="http://schemas.microsoft.com/office/drawing/2014/main" id="{83EF32E6-A27C-4859-8CAD-D905185B2DC0}"/>
-              </a:ext>
-            </a:extLst>
-          </p:cNvPr>
-          <p:cNvPicPr>
-            <a:picLocks noChangeAspect="1"/>
-          </p:cNvPicPr>
-          <p:nvPr/>
-        </p:nvPicPr>
-        <p:blipFill>
-          <a:blip r:embed="rId3"/>
-          <a:stretch>
-            <a:fillRect/>
-          </a:stretch>
-        </p:blipFill>
-        <p:spPr>
-          <a:xfrm>
-            <a:off x="8224430" y="2576573"/>
-            <a:ext cx="3284477" cy="3284477"/>
-          </a:xfrm>
-          <a:prstGeom prst="rect">
-            <a:avLst/>
-          </a:prstGeom>
-        </p:spPr>
-      </p:pic>
-    </p:spTree>
-    <p:extLst>
-      <p:ext uri="{BB962C8B-B14F-4D97-AF65-F5344CB8AC3E}">
-        <p14:creationId xmlns:p14="http://schemas.microsoft.com/office/powerpoint/2010/main" val="2137423748"/>
-      </p:ext>
-    </p:extLst>
-  </p:cSld>
-  <p:clrMapOvr>
-    <a:masterClrMapping/>
-  </p:clrMapOvr>
-</p:sld>
-</file>
-
-<file path=ppt/slides/slide6.xml><?xml version="1.0" encoding="utf-8"?>
-<p:sld xmlns:a="http://schemas.openxmlformats.org/drawingml/2006/main" xmlns:r="http://schemas.openxmlformats.org/officeDocument/2006/relationships" xmlns:p="http://schemas.openxmlformats.org/presentationml/2006/main">
-  <p:cSld>
-    <p:spTree>
-      <p:nvGrpSpPr>
-        <p:cNvPr id="1" name=""/>
-        <p:cNvGrpSpPr/>
-        <p:nvPr/>
-      </p:nvGrpSpPr>
-      <p:grpSpPr>
-        <a:xfrm>
-          <a:off x="0" y="0"/>
-          <a:ext cx="0" cy="0"/>
-          <a:chOff x="0" y="0"/>
-          <a:chExt cx="0" cy="0"/>
-        </a:xfrm>
-      </p:grpSpPr>
-      <p:sp>
-        <p:nvSpPr>
-          <p:cNvPr id="2" name="Titre 1">
-            <a:extLst>
-              <a:ext uri="{FF2B5EF4-FFF2-40B4-BE49-F238E27FC236}">
-                <a16:creationId xmlns:a16="http://schemas.microsoft.com/office/drawing/2014/main" id="{B2F989FB-C56F-4DBE-8BD5-8217486EF679}"/>
-              </a:ext>
-            </a:extLst>
-          </p:cNvPr>
-          <p:cNvSpPr>
-            <a:spLocks noGrp="1"/>
-          </p:cNvSpPr>
-          <p:nvPr>
-            <p:ph type="title"/>
-          </p:nvPr>
-        </p:nvSpPr>
-        <p:spPr/>
-        <p:txBody>
-          <a:bodyPr/>
-          <a:lstStyle/>
-          <a:p>
-            <a:r>
-              <a:rPr lang="fr-FR" dirty="0"/>
-              <a:t>II- Anatomie du drone </a:t>
-            </a:r>
-          </a:p>
-        </p:txBody>
-      </p:sp>
-      <p:sp>
-        <p:nvSpPr>
-          <p:cNvPr id="5" name="Espace réservé du contenu 4">
-            <a:extLst>
-              <a:ext uri="{FF2B5EF4-FFF2-40B4-BE49-F238E27FC236}">
-                <a16:creationId xmlns:a16="http://schemas.microsoft.com/office/drawing/2014/main" id="{BD261B13-EB79-473B-96D5-121DE8B27CF7}"/>
-              </a:ext>
-            </a:extLst>
-          </p:cNvPr>
-          <p:cNvSpPr>
-            <a:spLocks noGrp="1"/>
-          </p:cNvSpPr>
-          <p:nvPr>
-            <p:ph sz="half" idx="1"/>
-          </p:nvPr>
-        </p:nvSpPr>
-        <p:spPr/>
-        <p:txBody>
-          <a:bodyPr anchor="t"/>
-          <a:lstStyle/>
-          <a:p>
-            <a:r>
-              <a:rPr lang="fr-FR" dirty="0"/>
-              <a:t>ESC / Moteurs </a:t>
-            </a:r>
-            <a:r>
-              <a:rPr lang="fr-FR" dirty="0" err="1"/>
-              <a:t>brushless</a:t>
-            </a:r>
-            <a:r>
-              <a:rPr lang="fr-FR" dirty="0"/>
-              <a:t> </a:t>
-            </a:r>
-          </a:p>
-        </p:txBody>
-      </p:sp>
-      <p:sp>
-        <p:nvSpPr>
-          <p:cNvPr id="4" name="Espace réservé du numéro de diapositive 3">
-            <a:extLst>
-              <a:ext uri="{FF2B5EF4-FFF2-40B4-BE49-F238E27FC236}">
-                <a16:creationId xmlns:a16="http://schemas.microsoft.com/office/drawing/2014/main" id="{BD632CD5-BD5D-4D52-8704-2578DD021FB2}"/>
-              </a:ext>
-            </a:extLst>
-          </p:cNvPr>
-          <p:cNvSpPr>
-            <a:spLocks noGrp="1"/>
-          </p:cNvSpPr>
-          <p:nvPr>
-            <p:ph type="sldNum" sz="quarter" idx="12"/>
-          </p:nvPr>
-        </p:nvSpPr>
-        <p:spPr/>
-        <p:txBody>
-          <a:bodyPr/>
-          <a:lstStyle/>
-          <a:p>
-            <a:fld id="{D57F1E4F-1CFF-5643-939E-217C01CDF565}" type="slidenum">
-              <a:rPr lang="en-US" smtClean="0"/>
-              <a:pPr/>
-              <a:t>6</a:t>
-            </a:fld>
-            <a:endParaRPr lang="en-US" dirty="0"/>
-          </a:p>
-        </p:txBody>
-      </p:sp>
-      <p:pic>
-        <p:nvPicPr>
-          <p:cNvPr id="6" name="Image 5">
-            <a:extLst>
-              <a:ext uri="{FF2B5EF4-FFF2-40B4-BE49-F238E27FC236}">
-                <a16:creationId xmlns:a16="http://schemas.microsoft.com/office/drawing/2014/main" id="{733D7656-48F5-4788-AD8B-492825DE3419}"/>
-              </a:ext>
-            </a:extLst>
-          </p:cNvPr>
-          <p:cNvPicPr>
-            <a:picLocks noChangeAspect="1"/>
-          </p:cNvPicPr>
-          <p:nvPr/>
-        </p:nvPicPr>
-        <p:blipFill>
-          <a:blip r:embed="rId2"/>
-          <a:stretch>
-            <a:fillRect/>
-          </a:stretch>
-        </p:blipFill>
-        <p:spPr>
-          <a:xfrm>
-            <a:off x="2890129" y="3036891"/>
-            <a:ext cx="6226908" cy="3091451"/>
-          </a:xfrm>
-          <a:prstGeom prst="rect">
-            <a:avLst/>
-          </a:prstGeom>
-        </p:spPr>
-      </p:pic>
-    </p:spTree>
-    <p:extLst>
-      <p:ext uri="{BB962C8B-B14F-4D97-AF65-F5344CB8AC3E}">
-        <p14:creationId xmlns:p14="http://schemas.microsoft.com/office/powerpoint/2010/main" val="700632873"/>
       </p:ext>
     </p:extLst>
   </p:cSld>

</xml_diff>